<commit_message>
Small changes in preparation for the Lunch-and-Learn
</commit_message>
<xml_diff>
--- a/Introduction to TypeScript.pptx
+++ b/Introduction to TypeScript.pptx
@@ -119,7 +119,7 @@
   </p:defaultTextStyle>
   <p:extLst>
     <p:ext uri="{EFAFB233-063F-42B5-8137-9DF3F51BA10A}">
-      <p15:sldGuideLst xmlns:p15="http://schemas.microsoft.com/office/powerpoint/2012/main" xmlns="">
+      <p15:sldGuideLst xmlns:p15="http://schemas.microsoft.com/office/powerpoint/2012/main">
         <p15:guide id="1" orient="horz" pos="2160" userDrawn="1">
           <p15:clr>
             <a:srgbClr val="A4A3A4"/>
@@ -226,7 +226,7 @@
           <a:p>
             <a:fld id="{52F82EA8-271C-D440-8460-3278DBA1949D}" type="datetimeFigureOut">
               <a:rPr lang="en-US" smtClean="0"/>
-              <a:t>10/31/2015</a:t>
+              <a:t>11/3/2015</a:t>
             </a:fld>
             <a:endParaRPr lang="en-US"/>
           </a:p>
@@ -1132,6 +1132,10 @@
               <a:rPr lang="en-US" baseline="0" dirty="0" smtClean="0"/>
               <a:t>(2) Compile-Time Type Checking </a:t>
             </a:r>
+            <a:r>
+              <a:rPr lang="en-US" baseline="0" dirty="0" smtClean="0"/>
+              <a:t>(file02-PrimitiveTypes.TS against .JS file)</a:t>
+            </a:r>
           </a:p>
           <a:p>
             <a:pPr marL="685800" marR="0" lvl="1" indent="-228600" algn="l" defTabSz="457200" rtl="0" eaLnBrk="1" fontAlgn="auto" latinLnBrk="0" hangingPunct="1">
@@ -1157,7 +1161,15 @@
                   <a:srgbClr val="FF0000"/>
                 </a:solidFill>
               </a:rPr>
-              <a:t>Primitive Types: number, </a:t>
+              <a:t>Primitive </a:t>
+            </a:r>
+            <a:r>
+              <a:rPr lang="en-US" dirty="0" smtClean="0">
+                <a:solidFill>
+                  <a:srgbClr val="FF0000"/>
+                </a:solidFill>
+              </a:rPr>
+              <a:t>Types: number, </a:t>
             </a:r>
             <a:r>
               <a:rPr lang="en-US" dirty="0" err="1" smtClean="0">
@@ -1188,17 +1200,11 @@
             </a:pPr>
             <a:r>
               <a:rPr lang="en-US" baseline="0" dirty="0" smtClean="0"/>
-              <a:t>Show file02-PrimitiveTypes.TS against .JS file</a:t>
-            </a:r>
-          </a:p>
-          <a:p>
-            <a:pPr marL="685800" lvl="1" indent="-228600">
-              <a:buFont typeface="Arial" panose="020B0604020202020204" pitchFamily="34" charset="0"/>
-              <a:buChar char="•"/>
-            </a:pPr>
+              <a:t>Browse </a:t>
+            </a:r>
             <a:r>
               <a:rPr lang="en-US" baseline="0" dirty="0" smtClean="0"/>
-              <a:t>Browse to index02-*.html</a:t>
+              <a:t>to index02-*.html</a:t>
             </a:r>
           </a:p>
           <a:p>
@@ -1817,7 +1823,7 @@
           <a:p>
             <a:fld id="{C8A432C8-69A7-458B-9684-2BFA64B31948}" type="datetime2">
               <a:rPr lang="en-US" smtClean="0"/>
-              <a:t>Saturday, October 31, 2015</a:t>
+              <a:t>Tuesday, November 03, 2015</a:t>
             </a:fld>
             <a:endParaRPr lang="en-US"/>
           </a:p>
@@ -2056,7 +2062,7 @@
           <a:p>
             <a:fld id="{8CC057FC-95B6-4D89-AFDA-ABA33EE921E5}" type="datetime2">
               <a:rPr lang="en-US" smtClean="0"/>
-              <a:t>Saturday, October 31, 2015</a:t>
+              <a:t>Tuesday, November 03, 2015</a:t>
             </a:fld>
             <a:endParaRPr lang="en-US"/>
           </a:p>
@@ -2233,7 +2239,7 @@
           <a:p>
             <a:fld id="{EC4549AC-EB31-477F-92A9-B1988E232878}" type="datetime2">
               <a:rPr lang="en-US" smtClean="0"/>
-              <a:t>Saturday, October 31, 2015</a:t>
+              <a:t>Tuesday, November 03, 2015</a:t>
             </a:fld>
             <a:endParaRPr lang="en-US"/>
           </a:p>
@@ -2436,7 +2442,7 @@
           <a:p>
             <a:fld id="{6396A3A3-94A6-4E5B-AF39-173ACA3E61CC}" type="datetime2">
               <a:rPr lang="en-US" smtClean="0"/>
-              <a:t>Saturday, October 31, 2015</a:t>
+              <a:t>Tuesday, November 03, 2015</a:t>
             </a:fld>
             <a:endParaRPr lang="en-US"/>
           </a:p>
@@ -2686,7 +2692,7 @@
           <a:p>
             <a:fld id="{9933D019-A32C-4EAD-B8E6-DBDA699692FD}" type="datetime2">
               <a:rPr lang="en-US" smtClean="0"/>
-              <a:t>Saturday, October 31, 2015</a:t>
+              <a:t>Tuesday, November 03, 2015</a:t>
             </a:fld>
             <a:endParaRPr lang="en-US"/>
           </a:p>
@@ -3000,7 +3006,7 @@
           <a:p>
             <a:fld id="{CCEBA98F-560C-4997-81C4-81D4D9187EAB}" type="datetime2">
               <a:rPr lang="en-US" smtClean="0"/>
-              <a:t>Saturday, October 31, 2015</a:t>
+              <a:t>Tuesday, November 03, 2015</a:t>
             </a:fld>
             <a:endParaRPr lang="en-US"/>
           </a:p>
@@ -3468,7 +3474,7 @@
           <a:p>
             <a:fld id="{150972B2-CA5C-437D-87D0-8081271A9E4B}" type="datetime2">
               <a:rPr lang="en-US" smtClean="0"/>
-              <a:t>Saturday, October 31, 2015</a:t>
+              <a:t>Tuesday, November 03, 2015</a:t>
             </a:fld>
             <a:endParaRPr lang="en-US"/>
           </a:p>
@@ -3618,7 +3624,7 @@
           <a:p>
             <a:fld id="{79CD4847-11EF-4466-A8AD-85CDB7B49118}" type="datetime2">
               <a:rPr lang="en-US" smtClean="0"/>
-              <a:t>Saturday, October 31, 2015</a:t>
+              <a:t>Tuesday, November 03, 2015</a:t>
             </a:fld>
             <a:endParaRPr lang="en-US"/>
           </a:p>
@@ -3710,7 +3716,7 @@
           <a:p>
             <a:fld id="{F168457A-3AB9-4880-8A0C-9F8524491207}" type="datetime2">
               <a:rPr lang="en-US" smtClean="0"/>
-              <a:t>Saturday, October 31, 2015</a:t>
+              <a:t>Tuesday, November 03, 2015</a:t>
             </a:fld>
             <a:endParaRPr lang="en-US"/>
           </a:p>
@@ -3986,7 +3992,7 @@
           <a:p>
             <a:fld id="{3FE976D3-5B7F-4300-ABED-C91F1B2AE209}" type="datetime2">
               <a:rPr lang="en-US" smtClean="0"/>
-              <a:t>Saturday, October 31, 2015</a:t>
+              <a:t>Tuesday, November 03, 2015</a:t>
             </a:fld>
             <a:endParaRPr lang="en-US"/>
           </a:p>
@@ -4293,7 +4299,7 @@
           <a:p>
             <a:fld id="{EBDC1E59-17DD-41CE-97CA-624A472382D4}" type="datetime2">
               <a:rPr lang="en-US" smtClean="0"/>
-              <a:t>Saturday, October 31, 2015</a:t>
+              <a:t>Tuesday, November 03, 2015</a:t>
             </a:fld>
             <a:endParaRPr lang="en-US"/>
           </a:p>
@@ -4577,7 +4583,7 @@
           <a:p>
             <a:fld id="{A80CB818-7379-467D-8E76-EF9D9074A26C}" type="datetime2">
               <a:rPr lang="en-US" smtClean="0"/>
-              <a:t>Saturday, October 31, 2015</a:t>
+              <a:t>Tuesday, November 03, 2015</a:t>
             </a:fld>
             <a:endParaRPr lang="en-US" dirty="0"/>
           </a:p>
@@ -7877,7 +7883,7 @@
   <a:extraClrSchemeLst/>
   <a:extLst>
     <a:ext uri="{05A4C25C-085E-4340-85A3-A5531E510DB2}">
-      <thm15:themeFamily xmlns:thm15="http://schemas.microsoft.com/office/thememl/2012/main" xmlns="" name="SolTech Presentation Template.potx" id="{B2176C02-E6F9-4DE0-BB06-907DC797FC17}" vid="{624E5072-2AE6-4041-A5DC-11FDAAF8553E}"/>
+      <thm15:themeFamily xmlns:thm15="http://schemas.microsoft.com/office/thememl/2012/main" name="SolTech Presentation Template.potx" id="{B2176C02-E6F9-4DE0-BB06-907DC797FC17}" vid="{624E5072-2AE6-4041-A5DC-11FDAAF8553E}"/>
     </a:ext>
   </a:extLst>
 </a:theme>
@@ -7891,7 +7897,7 @@
         <a:sysClr val="windowText" lastClr="000000"/>
       </a:dk1>
       <a:lt1>
-        <a:sysClr val="window" lastClr="EFEFEF"/>
+        <a:sysClr val="window" lastClr="FFFFFF"/>
       </a:lt1>
       <a:dk2>
         <a:srgbClr val="1F497D"/>

</xml_diff>